<commit_message>
slide plan de management
</commit_message>
<xml_diff>
--- a/ppt.pptx
+++ b/ppt.pptx
@@ -5,13 +5,14 @@
     <p:sldMasterId id="2147483648" r:id="rId1"/>
   </p:sldMasterIdLst>
   <p:notesMasterIdLst>
-    <p:notesMasterId r:id="rId6"/>
+    <p:notesMasterId r:id="rId7"/>
   </p:notesMasterIdLst>
   <p:sldIdLst>
     <p:sldId id="267" r:id="rId2"/>
     <p:sldId id="269" r:id="rId3"/>
-    <p:sldId id="258" r:id="rId4"/>
-    <p:sldId id="270" r:id="rId5"/>
+    <p:sldId id="271" r:id="rId4"/>
+    <p:sldId id="258" r:id="rId5"/>
+    <p:sldId id="270" r:id="rId6"/>
   </p:sldIdLst>
   <p:sldSz cx="12192000" cy="6858000"/>
   <p:notesSz cx="7559675" cy="10691813"/>
@@ -6232,7 +6233,7 @@
           <a:p>
             <a:fld id="{BF1E4C38-38C3-4C47-B9B7-EF45359A68DE}" type="datetimeFigureOut">
               <a:rPr lang="fr-FR" smtClean="0"/>
-              <a:t>21/04/2020</a:t>
+              <a:t>24/04/2020</a:t>
             </a:fld>
             <a:endParaRPr lang="fr-FR"/>
           </a:p>
@@ -6573,7 +6574,7 @@
     </p:spTree>
     <p:extLst>
       <p:ext uri="{BB962C8B-B14F-4D97-AF65-F5344CB8AC3E}">
-        <p14:creationId xmlns:p14="http://schemas.microsoft.com/office/powerpoint/2010/main" val="2483412090"/>
+        <p14:creationId xmlns:p14="http://schemas.microsoft.com/office/powerpoint/2010/main" val="3935378086"/>
       </p:ext>
     </p:extLst>
   </p:cSld>
@@ -6649,6 +6650,90 @@
             <a:fld id="{4C7EF9AC-3BAF-43D8-A225-8BB59E7B2206}" type="slidenum">
               <a:rPr lang="fr-FR" smtClean="0"/>
               <a:t>4</a:t>
+            </a:fld>
+            <a:endParaRPr lang="fr-FR"/>
+          </a:p>
+        </p:txBody>
+      </p:sp>
+    </p:spTree>
+    <p:extLst>
+      <p:ext uri="{BB962C8B-B14F-4D97-AF65-F5344CB8AC3E}">
+        <p14:creationId xmlns:p14="http://schemas.microsoft.com/office/powerpoint/2010/main" val="2483412090"/>
+      </p:ext>
+    </p:extLst>
+  </p:cSld>
+  <p:clrMapOvr>
+    <a:masterClrMapping/>
+  </p:clrMapOvr>
+</p:notes>
+</file>
+
+<file path=ppt/notesSlides/notesSlide3.xml><?xml version="1.0" encoding="utf-8"?>
+<p:notes xmlns:a="http://schemas.openxmlformats.org/drawingml/2006/main" xmlns:r="http://schemas.openxmlformats.org/officeDocument/2006/relationships" xmlns:p="http://schemas.openxmlformats.org/presentationml/2006/main">
+  <p:cSld>
+    <p:spTree>
+      <p:nvGrpSpPr>
+        <p:cNvPr id="1" name=""/>
+        <p:cNvGrpSpPr/>
+        <p:nvPr/>
+      </p:nvGrpSpPr>
+      <p:grpSpPr>
+        <a:xfrm>
+          <a:off x="0" y="0"/>
+          <a:ext cx="0" cy="0"/>
+          <a:chOff x="0" y="0"/>
+          <a:chExt cx="0" cy="0"/>
+        </a:xfrm>
+      </p:grpSpPr>
+      <p:sp>
+        <p:nvSpPr>
+          <p:cNvPr id="2" name="Espace réservé de l'image des diapositives 1"/>
+          <p:cNvSpPr>
+            <a:spLocks noGrp="1" noRot="1" noChangeAspect="1"/>
+          </p:cNvSpPr>
+          <p:nvPr>
+            <p:ph type="sldImg"/>
+          </p:nvPr>
+        </p:nvSpPr>
+        <p:spPr/>
+      </p:sp>
+      <p:sp>
+        <p:nvSpPr>
+          <p:cNvPr id="3" name="Espace réservé des notes 2"/>
+          <p:cNvSpPr>
+            <a:spLocks noGrp="1"/>
+          </p:cNvSpPr>
+          <p:nvPr>
+            <p:ph type="body" idx="1"/>
+          </p:nvPr>
+        </p:nvSpPr>
+        <p:spPr/>
+        <p:txBody>
+          <a:bodyPr/>
+          <a:lstStyle/>
+          <a:p>
+            <a:endParaRPr lang="fr-FR" dirty="0"/>
+          </a:p>
+        </p:txBody>
+      </p:sp>
+      <p:sp>
+        <p:nvSpPr>
+          <p:cNvPr id="4" name="Espace réservé du numéro de diapositive 3"/>
+          <p:cNvSpPr>
+            <a:spLocks noGrp="1"/>
+          </p:cNvSpPr>
+          <p:nvPr>
+            <p:ph type="sldNum" sz="quarter" idx="5"/>
+          </p:nvPr>
+        </p:nvSpPr>
+        <p:spPr/>
+        <p:txBody>
+          <a:bodyPr/>
+          <a:lstStyle/>
+          <a:p>
+            <a:fld id="{4C7EF9AC-3BAF-43D8-A225-8BB59E7B2206}" type="slidenum">
+              <a:rPr lang="fr-FR" smtClean="0"/>
+              <a:t>5</a:t>
             </a:fld>
             <a:endParaRPr lang="fr-FR"/>
           </a:p>
@@ -7402,7 +7487,7 @@
           <a:p>
             <a:fld id="{638941B0-F4D5-4460-BCAD-F7E2B41A8257}" type="datetimeFigureOut">
               <a:rPr lang="de-DE" smtClean="0"/>
-              <a:t>21.04.2020</a:t>
+              <a:t>24.04.2020</a:t>
             </a:fld>
             <a:endParaRPr lang="de-DE"/>
           </a:p>
@@ -8461,7 +8546,7 @@
                 </a:solidFill>
                 <a:latin typeface="Calibri"/>
               </a:rPr>
-              <a:t>21/04/2020</a:t>
+              <a:t>24/04/2020</a:t>
             </a:fld>
             <a:endParaRPr lang="fr-FR" sz="1200" b="0" strike="noStrike" spc="-1">
               <a:latin typeface="Times New Roman"/>
@@ -9896,6 +9981,23 @@
               <a:defRPr/>
             </a:pPr>
             <a:r>
+              <a:rPr kumimoji="0" lang="fr-FR" sz="2400" b="1" i="0" u="none" strike="noStrike" kern="1200" cap="all" spc="0" normalizeH="0" baseline="0" noProof="0">
+                <a:ln>
+                  <a:noFill/>
+                </a:ln>
+                <a:solidFill>
+                  <a:srgbClr val="000000"/>
+                </a:solidFill>
+                <a:effectLst/>
+                <a:uLnTx/>
+                <a:uFillTx/>
+                <a:latin typeface="Century Gothic"/>
+                <a:ea typeface="+mn-ea"/>
+                <a:cs typeface="+mn-cs"/>
+              </a:rPr>
+              <a:t>Livrable 4 </a:t>
+            </a:r>
+            <a:r>
               <a:rPr kumimoji="0" lang="fr-FR" sz="2400" b="1" i="0" u="none" strike="noStrike" kern="1200" cap="all" spc="0" normalizeH="0" baseline="0" noProof="0" dirty="0">
                 <a:ln>
                   <a:noFill/>
@@ -9910,7 +10012,7 @@
                 <a:ea typeface="+mn-ea"/>
                 <a:cs typeface="+mn-cs"/>
               </a:rPr>
-              <a:t>Livrable 3 : </a:t>
+              <a:t>: </a:t>
             </a:r>
             <a:r>
               <a:rPr lang="fr-FR" sz="2400" dirty="0">
@@ -10346,7 +10448,7 @@
         <p:spPr>
           <a:xfrm>
             <a:off x="80303" y="1404505"/>
-            <a:ext cx="7789701" cy="1051826"/>
+            <a:ext cx="7789701" cy="1444242"/>
           </a:xfrm>
           <a:prstGeom prst="rect">
             <a:avLst/>
@@ -10365,7 +10467,7 @@
                   <a:srgbClr val="C84B1B"/>
                 </a:solidFill>
               </a:rPr>
-              <a:t>I/  Livrable 3</a:t>
+              <a:t>I/  Livrable 4</a:t>
             </a:r>
           </a:p>
           <a:p>
@@ -10383,7 +10485,18 @@
             </a:pPr>
             <a:r>
               <a:rPr lang="fr-FR" sz="1700" dirty="0"/>
-              <a:t>1) Déploiement</a:t>
+              <a:t>1) Plan de management</a:t>
+            </a:r>
+          </a:p>
+          <a:p>
+            <a:pPr>
+              <a:lnSpc>
+                <a:spcPct val="150000"/>
+              </a:lnSpc>
+            </a:pPr>
+            <a:r>
+              <a:rPr lang="fr-FR" sz="1700" dirty="0"/>
+              <a:t>2) Déploiement</a:t>
             </a:r>
             <a:endParaRPr lang="fr-FR" dirty="0">
               <a:solidFill>
@@ -10781,6 +10894,58 @@
                             </p:childTnLst>
                           </p:cTn>
                         </p:par>
+                        <p:par>
+                          <p:cTn id="12" fill="hold">
+                            <p:stCondLst>
+                              <p:cond delay="2000"/>
+                            </p:stCondLst>
+                            <p:childTnLst>
+                              <p:par>
+                                <p:cTn id="13" presetID="10" presetClass="entr" presetSubtype="0" fill="hold" nodeType="afterEffect">
+                                  <p:stCondLst>
+                                    <p:cond delay="1000"/>
+                                  </p:stCondLst>
+                                  <p:childTnLst>
+                                    <p:set>
+                                      <p:cBhvr>
+                                        <p:cTn id="14" dur="1" fill="hold">
+                                          <p:stCondLst>
+                                            <p:cond delay="0"/>
+                                          </p:stCondLst>
+                                        </p:cTn>
+                                        <p:tgtEl>
+                                          <p:spTgt spid="5">
+                                            <p:txEl>
+                                              <p:pRg st="3" end="3"/>
+                                            </p:txEl>
+                                          </p:spTgt>
+                                        </p:tgtEl>
+                                        <p:attrNameLst>
+                                          <p:attrName>style.visibility</p:attrName>
+                                        </p:attrNameLst>
+                                      </p:cBhvr>
+                                      <p:to>
+                                        <p:strVal val="visible"/>
+                                      </p:to>
+                                    </p:set>
+                                    <p:animEffect transition="in" filter="fade">
+                                      <p:cBhvr>
+                                        <p:cTn id="15" dur="500"/>
+                                        <p:tgtEl>
+                                          <p:spTgt spid="5">
+                                            <p:txEl>
+                                              <p:pRg st="3" end="3"/>
+                                            </p:txEl>
+                                          </p:spTgt>
+                                        </p:tgtEl>
+                                      </p:cBhvr>
+                                    </p:animEffect>
+                                  </p:childTnLst>
+                                </p:cTn>
+                              </p:par>
+                            </p:childTnLst>
+                          </p:cTn>
+                        </p:par>
                       </p:childTnLst>
                     </p:cTn>
                   </p:par>
@@ -10810,6 +10975,496 @@
 </file>
 
 <file path=ppt/slides/slide3.xml><?xml version="1.0" encoding="utf-8"?>
+<p:sld xmlns:a="http://schemas.openxmlformats.org/drawingml/2006/main" xmlns:r="http://schemas.openxmlformats.org/officeDocument/2006/relationships" xmlns:p="http://schemas.openxmlformats.org/presentationml/2006/main">
+  <p:cSld>
+    <p:spTree>
+      <p:nvGrpSpPr>
+        <p:cNvPr id="1" name=""/>
+        <p:cNvGrpSpPr/>
+        <p:nvPr/>
+      </p:nvGrpSpPr>
+      <p:grpSpPr>
+        <a:xfrm>
+          <a:off x="0" y="0"/>
+          <a:ext cx="0" cy="0"/>
+          <a:chOff x="0" y="0"/>
+          <a:chExt cx="0" cy="0"/>
+        </a:xfrm>
+      </p:grpSpPr>
+      <p:pic>
+        <p:nvPicPr>
+          <p:cNvPr id="53" name="Picture 2"/>
+          <p:cNvPicPr/>
+          <p:nvPr/>
+        </p:nvPicPr>
+        <p:blipFill>
+          <a:blip r:embed="rId3"/>
+          <a:stretch/>
+        </p:blipFill>
+        <p:spPr>
+          <a:xfrm>
+            <a:off x="0" y="0"/>
+            <a:ext cx="12189960" cy="7338497"/>
+          </a:xfrm>
+          <a:prstGeom prst="rect">
+            <a:avLst/>
+          </a:prstGeom>
+          <a:ln>
+            <a:noFill/>
+          </a:ln>
+        </p:spPr>
+      </p:pic>
+      <p:sp>
+        <p:nvSpPr>
+          <p:cNvPr id="54" name="CustomShape 1"/>
+          <p:cNvSpPr/>
+          <p:nvPr/>
+        </p:nvSpPr>
+        <p:spPr>
+          <a:xfrm>
+            <a:off x="80280" y="209880"/>
+            <a:ext cx="6515280" cy="516960"/>
+          </a:xfrm>
+          <a:prstGeom prst="rect">
+            <a:avLst/>
+          </a:prstGeom>
+          <a:noFill/>
+          <a:ln>
+            <a:noFill/>
+          </a:ln>
+        </p:spPr>
+        <p:style>
+          <a:lnRef idx="0">
+            <a:scrgbClr r="0" g="0" b="0"/>
+          </a:lnRef>
+          <a:fillRef idx="0">
+            <a:scrgbClr r="0" g="0" b="0"/>
+          </a:fillRef>
+          <a:effectRef idx="0">
+            <a:scrgbClr r="0" g="0" b="0"/>
+          </a:effectRef>
+          <a:fontRef idx="minor"/>
+        </p:style>
+        <p:txBody>
+          <a:bodyPr lIns="90000" tIns="45000" rIns="90000" bIns="45000"/>
+          <a:lstStyle/>
+          <a:p>
+            <a:pPr>
+              <a:lnSpc>
+                <a:spcPct val="100000"/>
+              </a:lnSpc>
+            </a:pPr>
+            <a:r>
+              <a:rPr lang="fr-FR" sz="2800" b="1" spc="-1" dirty="0">
+                <a:solidFill>
+                  <a:srgbClr val="FFFFFF"/>
+                </a:solidFill>
+                <a:latin typeface="Calibri"/>
+              </a:rPr>
+              <a:t>1</a:t>
+            </a:r>
+            <a:r>
+              <a:rPr lang="fr-FR" sz="2800" b="1" strike="noStrike" spc="-1" dirty="0">
+                <a:solidFill>
+                  <a:srgbClr val="FFFFFF"/>
+                </a:solidFill>
+                <a:latin typeface="Calibri"/>
+              </a:rPr>
+              <a:t>) Plan de mangement</a:t>
+            </a:r>
+            <a:endParaRPr lang="fr-FR" sz="2800" b="0" strike="noStrike" spc="-1" dirty="0">
+              <a:latin typeface="Arial"/>
+            </a:endParaRPr>
+          </a:p>
+        </p:txBody>
+      </p:sp>
+      <p:grpSp>
+        <p:nvGrpSpPr>
+          <p:cNvPr id="65" name="Group 12"/>
+          <p:cNvGrpSpPr/>
+          <p:nvPr/>
+        </p:nvGrpSpPr>
+        <p:grpSpPr>
+          <a:xfrm>
+            <a:off x="0" y="0"/>
+            <a:ext cx="36000" cy="36000"/>
+            <a:chOff x="0" y="0"/>
+            <a:chExt cx="36000" cy="36000"/>
+          </a:xfrm>
+        </p:grpSpPr>
+      </p:grpSp>
+      <p:pic>
+        <p:nvPicPr>
+          <p:cNvPr id="1026" name="Picture 2" descr="Résultat de recherche d'images pour &quot;icone analyse&quot;">
+            <a:extLst>
+              <a:ext uri="{FF2B5EF4-FFF2-40B4-BE49-F238E27FC236}">
+                <a16:creationId xmlns:a16="http://schemas.microsoft.com/office/drawing/2014/main" id="{5BC3A468-2B17-4AE6-9F06-B13B229A5F68}"/>
+              </a:ext>
+            </a:extLst>
+          </p:cNvPr>
+          <p:cNvPicPr>
+            <a:picLocks noChangeAspect="1" noChangeArrowheads="1"/>
+          </p:cNvPicPr>
+          <p:nvPr/>
+        </p:nvPicPr>
+        <p:blipFill>
+          <a:blip r:embed="rId4">
+            <a:extLst>
+              <a:ext uri="{28A0092B-C50C-407E-A947-70E740481C1C}">
+                <a14:useLocalDpi xmlns:a14="http://schemas.microsoft.com/office/drawing/2010/main" val="0"/>
+              </a:ext>
+            </a:extLst>
+          </a:blip>
+          <a:srcRect/>
+          <a:stretch>
+            <a:fillRect/>
+          </a:stretch>
+        </p:blipFill>
+        <p:spPr bwMode="auto">
+          <a:xfrm>
+            <a:off x="458939" y="1955100"/>
+            <a:ext cx="985200" cy="985200"/>
+          </a:xfrm>
+          <a:prstGeom prst="rect">
+            <a:avLst/>
+          </a:prstGeom>
+          <a:noFill/>
+          <a:extLst>
+            <a:ext uri="{909E8E84-426E-40DD-AFC4-6F175D3DCCD1}">
+              <a14:hiddenFill xmlns:a14="http://schemas.microsoft.com/office/drawing/2010/main">
+                <a:solidFill>
+                  <a:srgbClr val="FFFFFF"/>
+                </a:solidFill>
+              </a14:hiddenFill>
+            </a:ext>
+          </a:extLst>
+        </p:spPr>
+      </p:pic>
+      <p:sp>
+        <p:nvSpPr>
+          <p:cNvPr id="2" name="ZoneTexte 1">
+            <a:extLst>
+              <a:ext uri="{FF2B5EF4-FFF2-40B4-BE49-F238E27FC236}">
+                <a16:creationId xmlns:a16="http://schemas.microsoft.com/office/drawing/2014/main" id="{9C2F2534-17C8-45A5-B348-FC7202D95798}"/>
+              </a:ext>
+            </a:extLst>
+          </p:cNvPr>
+          <p:cNvSpPr txBox="1"/>
+          <p:nvPr/>
+        </p:nvSpPr>
+        <p:spPr>
+          <a:xfrm>
+            <a:off x="1444139" y="2185829"/>
+            <a:ext cx="985200" cy="369332"/>
+          </a:xfrm>
+          <a:prstGeom prst="rect">
+            <a:avLst/>
+          </a:prstGeom>
+          <a:noFill/>
+        </p:spPr>
+        <p:txBody>
+          <a:bodyPr wrap="square" rtlCol="0">
+            <a:spAutoFit/>
+          </a:bodyPr>
+          <a:lstStyle/>
+          <a:p>
+            <a:r>
+              <a:rPr lang="fr-FR" dirty="0"/>
+              <a:t>Besoin</a:t>
+            </a:r>
+          </a:p>
+        </p:txBody>
+      </p:sp>
+      <p:pic>
+        <p:nvPicPr>
+          <p:cNvPr id="1028" name="Picture 4" descr="Résultat de recherche d'images pour &quot;icone planning&quot;">
+            <a:extLst>
+              <a:ext uri="{FF2B5EF4-FFF2-40B4-BE49-F238E27FC236}">
+                <a16:creationId xmlns:a16="http://schemas.microsoft.com/office/drawing/2014/main" id="{6DBEF4DD-5721-4D8B-821D-8B448E9A103D}"/>
+              </a:ext>
+            </a:extLst>
+          </p:cNvPr>
+          <p:cNvPicPr>
+            <a:picLocks noChangeAspect="1" noChangeArrowheads="1"/>
+          </p:cNvPicPr>
+          <p:nvPr/>
+        </p:nvPicPr>
+        <p:blipFill>
+          <a:blip r:embed="rId5">
+            <a:extLst>
+              <a:ext uri="{28A0092B-C50C-407E-A947-70E740481C1C}">
+                <a14:useLocalDpi xmlns:a14="http://schemas.microsoft.com/office/drawing/2010/main" val="0"/>
+              </a:ext>
+            </a:extLst>
+          </a:blip>
+          <a:srcRect/>
+          <a:stretch>
+            <a:fillRect/>
+          </a:stretch>
+        </p:blipFill>
+        <p:spPr bwMode="auto">
+          <a:xfrm>
+            <a:off x="1869298" y="3218374"/>
+            <a:ext cx="831862" cy="831862"/>
+          </a:xfrm>
+          <a:prstGeom prst="rect">
+            <a:avLst/>
+          </a:prstGeom>
+          <a:noFill/>
+          <a:extLst>
+            <a:ext uri="{909E8E84-426E-40DD-AFC4-6F175D3DCCD1}">
+              <a14:hiddenFill xmlns:a14="http://schemas.microsoft.com/office/drawing/2010/main">
+                <a:solidFill>
+                  <a:srgbClr val="FFFFFF"/>
+                </a:solidFill>
+              </a14:hiddenFill>
+            </a:ext>
+          </a:extLst>
+        </p:spPr>
+      </p:pic>
+      <p:sp>
+        <p:nvSpPr>
+          <p:cNvPr id="11" name="ZoneTexte 10">
+            <a:extLst>
+              <a:ext uri="{FF2B5EF4-FFF2-40B4-BE49-F238E27FC236}">
+                <a16:creationId xmlns:a16="http://schemas.microsoft.com/office/drawing/2014/main" id="{C8A40365-F6C5-4327-92DD-D0A487ACE57F}"/>
+              </a:ext>
+            </a:extLst>
+          </p:cNvPr>
+          <p:cNvSpPr txBox="1"/>
+          <p:nvPr/>
+        </p:nvSpPr>
+        <p:spPr>
+          <a:xfrm>
+            <a:off x="2701159" y="3449639"/>
+            <a:ext cx="3016469" cy="369332"/>
+          </a:xfrm>
+          <a:prstGeom prst="rect">
+            <a:avLst/>
+          </a:prstGeom>
+          <a:noFill/>
+        </p:spPr>
+        <p:txBody>
+          <a:bodyPr wrap="square" rtlCol="0">
+            <a:spAutoFit/>
+          </a:bodyPr>
+          <a:lstStyle/>
+          <a:p>
+            <a:r>
+              <a:rPr lang="fr-FR" dirty="0"/>
+              <a:t>Organisation et planification</a:t>
+            </a:r>
+          </a:p>
+        </p:txBody>
+      </p:sp>
+      <p:pic>
+        <p:nvPicPr>
+          <p:cNvPr id="1030" name="Picture 6" descr="Résultat de recherche d'images pour &quot;icone liste&quot;">
+            <a:extLst>
+              <a:ext uri="{FF2B5EF4-FFF2-40B4-BE49-F238E27FC236}">
+                <a16:creationId xmlns:a16="http://schemas.microsoft.com/office/drawing/2014/main" id="{6CEFD77A-8A38-409D-8F86-6F8F31042397}"/>
+              </a:ext>
+            </a:extLst>
+          </p:cNvPr>
+          <p:cNvPicPr>
+            <a:picLocks noChangeAspect="1" noChangeArrowheads="1"/>
+          </p:cNvPicPr>
+          <p:nvPr/>
+        </p:nvPicPr>
+        <p:blipFill>
+          <a:blip r:embed="rId6">
+            <a:extLst>
+              <a:ext uri="{28A0092B-C50C-407E-A947-70E740481C1C}">
+                <a14:useLocalDpi xmlns:a14="http://schemas.microsoft.com/office/drawing/2010/main" val="0"/>
+              </a:ext>
+            </a:extLst>
+          </a:blip>
+          <a:srcRect/>
+          <a:stretch>
+            <a:fillRect/>
+          </a:stretch>
+        </p:blipFill>
+        <p:spPr bwMode="auto">
+          <a:xfrm>
+            <a:off x="3607838" y="4477571"/>
+            <a:ext cx="985200" cy="985200"/>
+          </a:xfrm>
+          <a:prstGeom prst="rect">
+            <a:avLst/>
+          </a:prstGeom>
+          <a:noFill/>
+          <a:extLst>
+            <a:ext uri="{909E8E84-426E-40DD-AFC4-6F175D3DCCD1}">
+              <a14:hiddenFill xmlns:a14="http://schemas.microsoft.com/office/drawing/2010/main">
+                <a:solidFill>
+                  <a:srgbClr val="FFFFFF"/>
+                </a:solidFill>
+              </a14:hiddenFill>
+            </a:ext>
+          </a:extLst>
+        </p:spPr>
+      </p:pic>
+      <p:sp>
+        <p:nvSpPr>
+          <p:cNvPr id="13" name="ZoneTexte 12">
+            <a:extLst>
+              <a:ext uri="{FF2B5EF4-FFF2-40B4-BE49-F238E27FC236}">
+                <a16:creationId xmlns:a16="http://schemas.microsoft.com/office/drawing/2014/main" id="{C58090B7-11B8-49B3-BE27-431BDC834708}"/>
+              </a:ext>
+            </a:extLst>
+          </p:cNvPr>
+          <p:cNvSpPr txBox="1"/>
+          <p:nvPr/>
+        </p:nvSpPr>
+        <p:spPr>
+          <a:xfrm>
+            <a:off x="4724390" y="4716138"/>
+            <a:ext cx="3016469" cy="369332"/>
+          </a:xfrm>
+          <a:prstGeom prst="rect">
+            <a:avLst/>
+          </a:prstGeom>
+          <a:noFill/>
+        </p:spPr>
+        <p:txBody>
+          <a:bodyPr wrap="square" rtlCol="0">
+            <a:spAutoFit/>
+          </a:bodyPr>
+          <a:lstStyle/>
+          <a:p>
+            <a:r>
+              <a:rPr lang="fr-FR" dirty="0"/>
+              <a:t>Ressources et risques</a:t>
+            </a:r>
+          </a:p>
+        </p:txBody>
+      </p:sp>
+      <p:pic>
+        <p:nvPicPr>
+          <p:cNvPr id="1032" name="Picture 8" descr="Résultat de recherche d'images pour &quot;icone actions&quot;">
+            <a:extLst>
+              <a:ext uri="{FF2B5EF4-FFF2-40B4-BE49-F238E27FC236}">
+                <a16:creationId xmlns:a16="http://schemas.microsoft.com/office/drawing/2014/main" id="{9FB529D8-C509-4C34-B5EC-90F33EFA98C6}"/>
+              </a:ext>
+            </a:extLst>
+          </p:cNvPr>
+          <p:cNvPicPr>
+            <a:picLocks noChangeAspect="1" noChangeArrowheads="1"/>
+          </p:cNvPicPr>
+          <p:nvPr/>
+        </p:nvPicPr>
+        <p:blipFill>
+          <a:blip r:embed="rId7">
+            <a:extLst>
+              <a:ext uri="{28A0092B-C50C-407E-A947-70E740481C1C}">
+                <a14:useLocalDpi xmlns:a14="http://schemas.microsoft.com/office/drawing/2010/main" val="0"/>
+              </a:ext>
+            </a:extLst>
+          </a:blip>
+          <a:srcRect/>
+          <a:stretch>
+            <a:fillRect/>
+          </a:stretch>
+        </p:blipFill>
+        <p:spPr bwMode="auto">
+          <a:xfrm>
+            <a:off x="5637127" y="5462762"/>
+            <a:ext cx="1619250" cy="1619250"/>
+          </a:xfrm>
+          <a:prstGeom prst="rect">
+            <a:avLst/>
+          </a:prstGeom>
+          <a:noFill/>
+          <a:extLst>
+            <a:ext uri="{909E8E84-426E-40DD-AFC4-6F175D3DCCD1}">
+              <a14:hiddenFill xmlns:a14="http://schemas.microsoft.com/office/drawing/2010/main">
+                <a:solidFill>
+                  <a:srgbClr val="FFFFFF"/>
+                </a:solidFill>
+              </a14:hiddenFill>
+            </a:ext>
+          </a:extLst>
+        </p:spPr>
+      </p:pic>
+      <p:sp>
+        <p:nvSpPr>
+          <p:cNvPr id="15" name="ZoneTexte 14">
+            <a:extLst>
+              <a:ext uri="{FF2B5EF4-FFF2-40B4-BE49-F238E27FC236}">
+                <a16:creationId xmlns:a16="http://schemas.microsoft.com/office/drawing/2014/main" id="{3133FD46-F053-4C84-83A5-CEC1E67CA587}"/>
+              </a:ext>
+            </a:extLst>
+          </p:cNvPr>
+          <p:cNvSpPr txBox="1"/>
+          <p:nvPr/>
+        </p:nvSpPr>
+        <p:spPr>
+          <a:xfrm>
+            <a:off x="7068187" y="5851244"/>
+            <a:ext cx="3016469" cy="369332"/>
+          </a:xfrm>
+          <a:prstGeom prst="rect">
+            <a:avLst/>
+          </a:prstGeom>
+          <a:noFill/>
+        </p:spPr>
+        <p:txBody>
+          <a:bodyPr wrap="square" rtlCol="0">
+            <a:spAutoFit/>
+          </a:bodyPr>
+          <a:lstStyle/>
+          <a:p>
+            <a:r>
+              <a:rPr lang="fr-FR" dirty="0"/>
+              <a:t>Tâches réalisées</a:t>
+            </a:r>
+          </a:p>
+        </p:txBody>
+      </p:sp>
+    </p:spTree>
+    <p:extLst>
+      <p:ext uri="{BB962C8B-B14F-4D97-AF65-F5344CB8AC3E}">
+        <p14:creationId xmlns:p14="http://schemas.microsoft.com/office/powerpoint/2010/main" val="4014266341"/>
+      </p:ext>
+    </p:extLst>
+  </p:cSld>
+  <p:clrMapOvr>
+    <a:masterClrMapping/>
+  </p:clrMapOvr>
+  <p:transition spd="slow">
+    <p:push dir="u"/>
+  </p:transition>
+  <p:timing>
+    <p:tnLst>
+      <p:par>
+        <p:cTn id="1" dur="indefinite" restart="never" nodeType="tmRoot">
+          <p:childTnLst>
+            <p:seq>
+              <p:cTn id="2" dur="indefinite" nodeType="mainSeq"/>
+              <p:prevCondLst>
+                <p:cond evt="onPrev" delay="0">
+                  <p:tgtEl>
+                    <p:sldTgt/>
+                  </p:tgtEl>
+                </p:cond>
+              </p:prevCondLst>
+              <p:nextCondLst>
+                <p:cond evt="onNext" delay="0">
+                  <p:tgtEl>
+                    <p:sldTgt/>
+                  </p:tgtEl>
+                </p:cond>
+              </p:nextCondLst>
+            </p:seq>
+          </p:childTnLst>
+        </p:cTn>
+      </p:par>
+    </p:tnLst>
+  </p:timing>
+</p:sld>
+</file>
+
+<file path=ppt/slides/slide4.xml><?xml version="1.0" encoding="utf-8"?>
 <p:sld xmlns:a="http://schemas.openxmlformats.org/drawingml/2006/main" xmlns:r="http://schemas.openxmlformats.org/officeDocument/2006/relationships" xmlns:p="http://schemas.openxmlformats.org/presentationml/2006/main">
   <p:cSld>
     <p:spTree>
@@ -11210,7 +11865,7 @@
 </p:sld>
 </file>
 
-<file path=ppt/slides/slide4.xml><?xml version="1.0" encoding="utf-8"?>
+<file path=ppt/slides/slide5.xml><?xml version="1.0" encoding="utf-8"?>
 <p:sld xmlns:a="http://schemas.openxmlformats.org/drawingml/2006/main" xmlns:r="http://schemas.openxmlformats.org/officeDocument/2006/relationships" xmlns:p="http://schemas.openxmlformats.org/presentationml/2006/main">
   <p:cSld>
     <p:spTree>

</xml_diff>